<commit_message>
accounting the cell type specific data
</commit_message>
<xml_diff>
--- a/doc/2016-06-10_L929cell-fit.pptx
+++ b/doc/2016-06-10_L929cell-fit.pptx
@@ -5,13 +5,16 @@
     <p:sldMasterId id="2147483648" r:id="rId1"/>
   </p:sldMasterIdLst>
   <p:notesMasterIdLst>
-    <p:notesMasterId r:id="rId6"/>
+    <p:notesMasterId r:id="rId9"/>
   </p:notesMasterIdLst>
   <p:sldIdLst>
     <p:sldId id="257" r:id="rId2"/>
     <p:sldId id="258" r:id="rId3"/>
     <p:sldId id="259" r:id="rId4"/>
     <p:sldId id="260" r:id="rId5"/>
+    <p:sldId id="261" r:id="rId6"/>
+    <p:sldId id="263" r:id="rId7"/>
+    <p:sldId id="264" r:id="rId8"/>
   </p:sldIdLst>
   <p:sldSz cx="12192000" cy="6858000"/>
   <p:notesSz cx="6858000" cy="9144000"/>
@@ -110,6 +113,11 @@
       </a:defRPr>
     </a:lvl9pPr>
   </p:defaultTextStyle>
+  <p:extLst>
+    <p:ext uri="{EFAFB233-063F-42B5-8137-9DF3F51BA10A}">
+      <p15:sldGuideLst xmlns:p15="http://schemas.microsoft.com/office/powerpoint/2012/main"/>
+    </p:ext>
+  </p:extLst>
 </p:presentation>
 </file>
 
@@ -713,6 +721,90 @@
     <p:extLst>
       <p:ext uri="{BB962C8B-B14F-4D97-AF65-F5344CB8AC3E}">
         <p14:creationId xmlns:p14="http://schemas.microsoft.com/office/powerpoint/2010/main" val="217871137"/>
+      </p:ext>
+    </p:extLst>
+  </p:cSld>
+  <p:clrMapOvr>
+    <a:masterClrMapping/>
+  </p:clrMapOvr>
+</p:notes>
+</file>
+
+<file path=ppt/notesSlides/notesSlide4.xml><?xml version="1.0" encoding="utf-8"?>
+<p:notes xmlns:a="http://schemas.openxmlformats.org/drawingml/2006/main" xmlns:r="http://schemas.openxmlformats.org/officeDocument/2006/relationships" xmlns:p="http://schemas.openxmlformats.org/presentationml/2006/main">
+  <p:cSld>
+    <p:spTree>
+      <p:nvGrpSpPr>
+        <p:cNvPr id="1" name=""/>
+        <p:cNvGrpSpPr/>
+        <p:nvPr/>
+      </p:nvGrpSpPr>
+      <p:grpSpPr>
+        <a:xfrm>
+          <a:off x="0" y="0"/>
+          <a:ext cx="0" cy="0"/>
+          <a:chOff x="0" y="0"/>
+          <a:chExt cx="0" cy="0"/>
+        </a:xfrm>
+      </p:grpSpPr>
+      <p:sp>
+        <p:nvSpPr>
+          <p:cNvPr id="2" name="Slide Image Placeholder 1"/>
+          <p:cNvSpPr>
+            <a:spLocks noGrp="1" noRot="1" noChangeAspect="1"/>
+          </p:cNvSpPr>
+          <p:nvPr>
+            <p:ph type="sldImg"/>
+          </p:nvPr>
+        </p:nvSpPr>
+        <p:spPr/>
+      </p:sp>
+      <p:sp>
+        <p:nvSpPr>
+          <p:cNvPr id="3" name="Notes Placeholder 2"/>
+          <p:cNvSpPr>
+            <a:spLocks noGrp="1"/>
+          </p:cNvSpPr>
+          <p:nvPr>
+            <p:ph type="body" idx="1"/>
+          </p:nvPr>
+        </p:nvSpPr>
+        <p:spPr/>
+        <p:txBody>
+          <a:bodyPr/>
+          <a:lstStyle/>
+          <a:p>
+            <a:endParaRPr lang="en-US"/>
+          </a:p>
+        </p:txBody>
+      </p:sp>
+      <p:sp>
+        <p:nvSpPr>
+          <p:cNvPr id="4" name="Slide Number Placeholder 3"/>
+          <p:cNvSpPr>
+            <a:spLocks noGrp="1"/>
+          </p:cNvSpPr>
+          <p:nvPr>
+            <p:ph type="sldNum" sz="quarter" idx="10"/>
+          </p:nvPr>
+        </p:nvSpPr>
+        <p:spPr/>
+        <p:txBody>
+          <a:bodyPr/>
+          <a:lstStyle/>
+          <a:p>
+            <a:fld id="{CD6F2E82-FF15-DE40-B016-A552256F1BC0}" type="slidenum">
+              <a:rPr lang="en-US" smtClean="0"/>
+              <a:t>7</a:t>
+            </a:fld>
+            <a:endParaRPr lang="en-US"/>
+          </a:p>
+        </p:txBody>
+      </p:sp>
+    </p:spTree>
+    <p:extLst>
+      <p:ext uri="{BB962C8B-B14F-4D97-AF65-F5344CB8AC3E}">
+        <p14:creationId xmlns:p14="http://schemas.microsoft.com/office/powerpoint/2010/main" val="399493245"/>
       </p:ext>
     </p:extLst>
   </p:cSld>
@@ -5615,6 +5707,13 @@
   <p:clrMapOvr>
     <a:masterClrMapping/>
   </p:clrMapOvr>
+  <p:timing>
+    <p:tnLst>
+      <p:par>
+        <p:cTn id="1" dur="indefinite" restart="never" nodeType="tmRoot"/>
+      </p:par>
+    </p:tnLst>
+  </p:timing>
 </p:sld>
 </file>
 
@@ -5712,11 +5811,18 @@
   <p:clrMapOvr>
     <a:masterClrMapping/>
   </p:clrMapOvr>
+  <p:timing>
+    <p:tnLst>
+      <p:par>
+        <p:cTn id="1" dur="indefinite" restart="never" nodeType="tmRoot"/>
+      </p:par>
+    </p:tnLst>
+  </p:timing>
 </p:sld>
 </file>
 
 <file path=ppt/slides/slide4.xml><?xml version="1.0" encoding="utf-8"?>
-<p:sld xmlns:a="http://schemas.openxmlformats.org/drawingml/2006/main" xmlns:r="http://schemas.openxmlformats.org/officeDocument/2006/relationships" xmlns:p="http://schemas.openxmlformats.org/presentationml/2006/main">
+<p:sld xmlns:a="http://schemas.openxmlformats.org/drawingml/2006/main" xmlns:r="http://schemas.openxmlformats.org/officeDocument/2006/relationships" xmlns:p="http://schemas.openxmlformats.org/presentationml/2006/main" show="0">
   <p:cSld>
     <p:spTree>
       <p:nvGrpSpPr>
@@ -5952,6 +6058,924 @@
   <p:clrMapOvr>
     <a:masterClrMapping/>
   </p:clrMapOvr>
+  <mc:AlternateContent xmlns:mc="http://schemas.openxmlformats.org/markup-compatibility/2006">
+    <mc:Choice xmlns:p14="http://schemas.microsoft.com/office/powerpoint/2010/main" Requires="p14">
+      <p:transition spd="slow" p14:dur="2000"/>
+    </mc:Choice>
+    <mc:Fallback>
+      <p:transition spd="slow"/>
+    </mc:Fallback>
+  </mc:AlternateContent>
+</p:sld>
+</file>
+
+<file path=ppt/slides/slide5.xml><?xml version="1.0" encoding="utf-8"?>
+<p:sld xmlns:a="http://schemas.openxmlformats.org/drawingml/2006/main" xmlns:r="http://schemas.openxmlformats.org/officeDocument/2006/relationships" xmlns:p="http://schemas.openxmlformats.org/presentationml/2006/main">
+  <p:cSld>
+    <p:spTree>
+      <p:nvGrpSpPr>
+        <p:cNvPr id="1" name=""/>
+        <p:cNvGrpSpPr/>
+        <p:nvPr/>
+      </p:nvGrpSpPr>
+      <p:grpSpPr>
+        <a:xfrm>
+          <a:off x="0" y="0"/>
+          <a:ext cx="0" cy="0"/>
+          <a:chOff x="0" y="0"/>
+          <a:chExt cx="0" cy="0"/>
+        </a:xfrm>
+      </p:grpSpPr>
+      <p:sp>
+        <p:nvSpPr>
+          <p:cNvPr id="2" name="Rectangle 1"/>
+          <p:cNvSpPr/>
+          <p:nvPr/>
+        </p:nvSpPr>
+        <p:spPr>
+          <a:xfrm>
+            <a:off x="1549400" y="235635"/>
+            <a:ext cx="9956800" cy="584775"/>
+          </a:xfrm>
+          <a:prstGeom prst="rect">
+            <a:avLst/>
+          </a:prstGeom>
+        </p:spPr>
+        <p:txBody>
+          <a:bodyPr wrap="square">
+            <a:spAutoFit/>
+          </a:bodyPr>
+          <a:lstStyle/>
+          <a:p>
+            <a:r>
+              <a:rPr lang="en-US" sz="3200" dirty="0" smtClean="0"/>
+              <a:t>Accounting cell type </a:t>
+            </a:r>
+            <a:r>
+              <a:rPr lang="en-US" sz="3200" smtClean="0"/>
+              <a:t>differences – experimental data</a:t>
+            </a:r>
+            <a:endParaRPr lang="en-US" sz="3200" dirty="0"/>
+          </a:p>
+        </p:txBody>
+      </p:sp>
+      <p:sp>
+        <p:nvSpPr>
+          <p:cNvPr id="4" name="Rectangle 3"/>
+          <p:cNvSpPr/>
+          <p:nvPr/>
+        </p:nvSpPr>
+        <p:spPr>
+          <a:xfrm>
+            <a:off x="7711661" y="2409448"/>
+            <a:ext cx="4267200" cy="1754326"/>
+          </a:xfrm>
+          <a:prstGeom prst="rect">
+            <a:avLst/>
+          </a:prstGeom>
+        </p:spPr>
+        <p:txBody>
+          <a:bodyPr wrap="square">
+            <a:spAutoFit/>
+          </a:bodyPr>
+          <a:lstStyle/>
+          <a:p>
+            <a:pPr marL="228600" indent="-228600">
+              <a:buFontTx/>
+              <a:buAutoNum type="arabicPeriod"/>
+            </a:pPr>
+            <a:r>
+              <a:rPr lang="en-US" dirty="0">
+                <a:solidFill>
+                  <a:srgbClr val="FF0000"/>
+                </a:solidFill>
+              </a:rPr>
+              <a:t>Basal </a:t>
+            </a:r>
+            <a:r>
+              <a:rPr lang="en-US" dirty="0"/>
+              <a:t>transcription rate constant: </a:t>
+            </a:r>
+            <a:r>
+              <a:rPr lang="en-US" dirty="0" err="1">
+                <a:solidFill>
+                  <a:srgbClr val="FF0000"/>
+                </a:solidFill>
+              </a:rPr>
+              <a:t>IkBb</a:t>
+            </a:r>
+            <a:r>
+              <a:rPr lang="en-US" dirty="0">
+                <a:solidFill>
+                  <a:srgbClr val="FF0000"/>
+                </a:solidFill>
+              </a:rPr>
+              <a:t> </a:t>
+            </a:r>
+            <a:r>
+              <a:rPr lang="en-US" dirty="0"/>
+              <a:t>increase </a:t>
+            </a:r>
+            <a:r>
+              <a:rPr lang="en-US" dirty="0">
+                <a:solidFill>
+                  <a:srgbClr val="FF0000"/>
+                </a:solidFill>
+              </a:rPr>
+              <a:t>3 </a:t>
+            </a:r>
+            <a:r>
+              <a:rPr lang="en-US" dirty="0" smtClean="0">
+                <a:solidFill>
+                  <a:srgbClr val="FF0000"/>
+                </a:solidFill>
+              </a:rPr>
+              <a:t>fold</a:t>
+            </a:r>
+            <a:endParaRPr lang="en-US" dirty="0" smtClean="0">
+              <a:solidFill>
+                <a:srgbClr val="FF0000"/>
+              </a:solidFill>
+            </a:endParaRPr>
+          </a:p>
+          <a:p>
+            <a:pPr marL="228600" indent="-228600">
+              <a:buFontTx/>
+              <a:buAutoNum type="arabicPeriod"/>
+            </a:pPr>
+            <a:r>
+              <a:rPr lang="en-US" dirty="0" smtClean="0">
+                <a:solidFill>
+                  <a:srgbClr val="FF0000"/>
+                </a:solidFill>
+              </a:rPr>
+              <a:t>Basal </a:t>
+            </a:r>
+            <a:r>
+              <a:rPr lang="en-US" baseline="0" dirty="0" smtClean="0"/>
+              <a:t>transcription rate constant: </a:t>
+            </a:r>
+            <a:r>
+              <a:rPr lang="en-US" baseline="0" dirty="0" err="1" smtClean="0">
+                <a:solidFill>
+                  <a:srgbClr val="FF0000"/>
+                </a:solidFill>
+              </a:rPr>
+              <a:t>IkBd</a:t>
+            </a:r>
+            <a:r>
+              <a:rPr lang="en-US" baseline="0" dirty="0" smtClean="0">
+                <a:solidFill>
+                  <a:srgbClr val="FF0000"/>
+                </a:solidFill>
+              </a:rPr>
+              <a:t> </a:t>
+            </a:r>
+            <a:r>
+              <a:rPr lang="en-US" baseline="0" dirty="0" smtClean="0"/>
+              <a:t>decrease </a:t>
+            </a:r>
+            <a:r>
+              <a:rPr lang="en-US" dirty="0">
+                <a:solidFill>
+                  <a:srgbClr val="FF0000"/>
+                </a:solidFill>
+              </a:rPr>
+              <a:t>5 </a:t>
+            </a:r>
+            <a:r>
+              <a:rPr lang="en-US" dirty="0" smtClean="0">
+                <a:solidFill>
+                  <a:srgbClr val="FF0000"/>
+                </a:solidFill>
+              </a:rPr>
+              <a:t>fold</a:t>
+            </a:r>
+            <a:r>
+              <a:rPr lang="en-US" baseline="0" dirty="0" smtClean="0"/>
+              <a:t> </a:t>
+            </a:r>
+            <a:endParaRPr lang="en-US" baseline="0" dirty="0" smtClean="0"/>
+          </a:p>
+          <a:p>
+            <a:pPr marL="228600" indent="-228600">
+              <a:buFontTx/>
+              <a:buAutoNum type="arabicPeriod"/>
+              <a:defRPr/>
+            </a:pPr>
+            <a:r>
+              <a:rPr lang="en-US" dirty="0" err="1" smtClean="0">
+                <a:solidFill>
+                  <a:srgbClr val="FF0000"/>
+                </a:solidFill>
+              </a:rPr>
+              <a:t>Ikbe</a:t>
+            </a:r>
+            <a:r>
+              <a:rPr lang="en-US" dirty="0" smtClean="0">
+                <a:solidFill>
+                  <a:srgbClr val="FF0000"/>
+                </a:solidFill>
+              </a:rPr>
+              <a:t>: </a:t>
+            </a:r>
+            <a:r>
+              <a:rPr lang="en-US" dirty="0" smtClean="0"/>
+              <a:t>not sure, </a:t>
+            </a:r>
+            <a:r>
+              <a:rPr lang="en-US" dirty="0" err="1" smtClean="0"/>
+              <a:t>untouch</a:t>
+            </a:r>
+            <a:endParaRPr lang="en-US" baseline="0" dirty="0" smtClean="0"/>
+          </a:p>
+          <a:p>
+            <a:pPr marL="228600" indent="-228600">
+              <a:buAutoNum type="arabicPeriod"/>
+            </a:pPr>
+            <a:endParaRPr lang="en-US" dirty="0"/>
+          </a:p>
+        </p:txBody>
+      </p:sp>
+      <p:pic>
+        <p:nvPicPr>
+          <p:cNvPr id="5" name="Picture 4"/>
+          <p:cNvPicPr>
+            <a:picLocks noChangeAspect="1"/>
+          </p:cNvPicPr>
+          <p:nvPr/>
+        </p:nvPicPr>
+        <p:blipFill>
+          <a:blip r:embed="rId2">
+            <a:extLst>
+              <a:ext uri="{28A0092B-C50C-407E-A947-70E740481C1C}">
+                <a14:useLocalDpi xmlns:a14="http://schemas.microsoft.com/office/drawing/2010/main" val="0"/>
+              </a:ext>
+            </a:extLst>
+          </a:blip>
+          <a:stretch>
+            <a:fillRect/>
+          </a:stretch>
+        </p:blipFill>
+        <p:spPr>
+          <a:xfrm>
+            <a:off x="396461" y="820410"/>
+            <a:ext cx="7315200" cy="5486400"/>
+          </a:xfrm>
+          <a:prstGeom prst="rect">
+            <a:avLst/>
+          </a:prstGeom>
+        </p:spPr>
+      </p:pic>
+    </p:spTree>
+    <p:extLst>
+      <p:ext uri="{BB962C8B-B14F-4D97-AF65-F5344CB8AC3E}">
+        <p14:creationId xmlns:p14="http://schemas.microsoft.com/office/powerpoint/2010/main" val="833215350"/>
+      </p:ext>
+    </p:extLst>
+  </p:cSld>
+  <p:clrMapOvr>
+    <a:masterClrMapping/>
+  </p:clrMapOvr>
+  <p:timing>
+    <p:tnLst>
+      <p:par>
+        <p:cTn id="1" dur="indefinite" restart="never" nodeType="tmRoot"/>
+      </p:par>
+    </p:tnLst>
+  </p:timing>
+</p:sld>
+</file>
+
+<file path=ppt/slides/slide6.xml><?xml version="1.0" encoding="utf-8"?>
+<p:sld xmlns:a="http://schemas.openxmlformats.org/drawingml/2006/main" xmlns:r="http://schemas.openxmlformats.org/officeDocument/2006/relationships" xmlns:p="http://schemas.openxmlformats.org/presentationml/2006/main">
+  <p:cSld>
+    <p:spTree>
+      <p:nvGrpSpPr>
+        <p:cNvPr id="1" name=""/>
+        <p:cNvGrpSpPr/>
+        <p:nvPr/>
+      </p:nvGrpSpPr>
+      <p:grpSpPr>
+        <a:xfrm>
+          <a:off x="0" y="0"/>
+          <a:ext cx="0" cy="0"/>
+          <a:chOff x="0" y="0"/>
+          <a:chExt cx="0" cy="0"/>
+        </a:xfrm>
+      </p:grpSpPr>
+      <p:sp>
+        <p:nvSpPr>
+          <p:cNvPr id="2" name="Rectangle 1"/>
+          <p:cNvSpPr/>
+          <p:nvPr/>
+        </p:nvSpPr>
+        <p:spPr>
+          <a:xfrm>
+            <a:off x="1549400" y="235635"/>
+            <a:ext cx="9956800" cy="584775"/>
+          </a:xfrm>
+          <a:prstGeom prst="rect">
+            <a:avLst/>
+          </a:prstGeom>
+        </p:spPr>
+        <p:txBody>
+          <a:bodyPr wrap="square">
+            <a:spAutoFit/>
+          </a:bodyPr>
+          <a:lstStyle/>
+          <a:p>
+            <a:r>
+              <a:rPr lang="en-US" sz="3200" dirty="0" smtClean="0"/>
+              <a:t>Accounting cell type differences – Simulation results</a:t>
+            </a:r>
+            <a:endParaRPr lang="en-US" sz="3200" dirty="0"/>
+          </a:p>
+        </p:txBody>
+      </p:sp>
+      <p:sp>
+        <p:nvSpPr>
+          <p:cNvPr id="4" name="Rectangle 3"/>
+          <p:cNvSpPr/>
+          <p:nvPr/>
+        </p:nvSpPr>
+        <p:spPr>
+          <a:xfrm>
+            <a:off x="7711661" y="2409448"/>
+            <a:ext cx="4267200" cy="1754326"/>
+          </a:xfrm>
+          <a:prstGeom prst="rect">
+            <a:avLst/>
+          </a:prstGeom>
+        </p:spPr>
+        <p:txBody>
+          <a:bodyPr wrap="square">
+            <a:spAutoFit/>
+          </a:bodyPr>
+          <a:lstStyle/>
+          <a:p>
+            <a:pPr marL="228600" indent="-228600">
+              <a:buFontTx/>
+              <a:buAutoNum type="arabicPeriod"/>
+            </a:pPr>
+            <a:r>
+              <a:rPr lang="en-US" dirty="0">
+                <a:solidFill>
+                  <a:srgbClr val="FF0000"/>
+                </a:solidFill>
+              </a:rPr>
+              <a:t>Basal </a:t>
+            </a:r>
+            <a:r>
+              <a:rPr lang="en-US" dirty="0"/>
+              <a:t>transcription rate constant: </a:t>
+            </a:r>
+            <a:r>
+              <a:rPr lang="en-US" dirty="0" err="1">
+                <a:solidFill>
+                  <a:srgbClr val="FF0000"/>
+                </a:solidFill>
+              </a:rPr>
+              <a:t>IkBb</a:t>
+            </a:r>
+            <a:r>
+              <a:rPr lang="en-US" dirty="0">
+                <a:solidFill>
+                  <a:srgbClr val="FF0000"/>
+                </a:solidFill>
+              </a:rPr>
+              <a:t> increase</a:t>
+            </a:r>
+            <a:r>
+              <a:rPr lang="en-US" dirty="0"/>
+              <a:t> </a:t>
+            </a:r>
+            <a:r>
+              <a:rPr lang="en-US" dirty="0">
+                <a:solidFill>
+                  <a:srgbClr val="FF0000"/>
+                </a:solidFill>
+              </a:rPr>
+              <a:t>3 </a:t>
+            </a:r>
+            <a:r>
+              <a:rPr lang="en-US" dirty="0" smtClean="0">
+                <a:solidFill>
+                  <a:srgbClr val="FF0000"/>
+                </a:solidFill>
+              </a:rPr>
+              <a:t>fold</a:t>
+            </a:r>
+            <a:endParaRPr lang="en-US" dirty="0" smtClean="0">
+              <a:solidFill>
+                <a:srgbClr val="FF0000"/>
+              </a:solidFill>
+            </a:endParaRPr>
+          </a:p>
+          <a:p>
+            <a:pPr marL="228600" indent="-228600">
+              <a:buFontTx/>
+              <a:buAutoNum type="arabicPeriod"/>
+            </a:pPr>
+            <a:r>
+              <a:rPr lang="en-US" dirty="0" smtClean="0">
+                <a:solidFill>
+                  <a:srgbClr val="FF0000"/>
+                </a:solidFill>
+              </a:rPr>
+              <a:t>Basal </a:t>
+            </a:r>
+            <a:r>
+              <a:rPr lang="en-US" baseline="0" dirty="0" smtClean="0"/>
+              <a:t>transcription rate constant: </a:t>
+            </a:r>
+            <a:r>
+              <a:rPr lang="en-US" baseline="0" dirty="0" err="1" smtClean="0">
+                <a:solidFill>
+                  <a:srgbClr val="FF0000"/>
+                </a:solidFill>
+              </a:rPr>
+              <a:t>IkBd</a:t>
+            </a:r>
+            <a:r>
+              <a:rPr lang="en-US" baseline="0" dirty="0" smtClean="0">
+                <a:solidFill>
+                  <a:srgbClr val="FF0000"/>
+                </a:solidFill>
+              </a:rPr>
+              <a:t> </a:t>
+            </a:r>
+            <a:r>
+              <a:rPr lang="en-US" baseline="0" dirty="0" smtClean="0">
+                <a:solidFill>
+                  <a:srgbClr val="FF0000"/>
+                </a:solidFill>
+              </a:rPr>
+              <a:t>decrease</a:t>
+            </a:r>
+            <a:r>
+              <a:rPr lang="en-US" baseline="0" dirty="0" smtClean="0"/>
+              <a:t> </a:t>
+            </a:r>
+            <a:r>
+              <a:rPr lang="en-US" dirty="0">
+                <a:solidFill>
+                  <a:srgbClr val="FF0000"/>
+                </a:solidFill>
+              </a:rPr>
+              <a:t>5 </a:t>
+            </a:r>
+            <a:r>
+              <a:rPr lang="en-US" dirty="0" smtClean="0">
+                <a:solidFill>
+                  <a:srgbClr val="FF0000"/>
+                </a:solidFill>
+              </a:rPr>
+              <a:t>fold</a:t>
+            </a:r>
+            <a:r>
+              <a:rPr lang="en-US" baseline="0" dirty="0" smtClean="0"/>
+              <a:t> </a:t>
+            </a:r>
+            <a:endParaRPr lang="en-US" baseline="0" dirty="0" smtClean="0"/>
+          </a:p>
+          <a:p>
+            <a:pPr marL="228600" indent="-228600">
+              <a:buFontTx/>
+              <a:buAutoNum type="arabicPeriod"/>
+              <a:defRPr/>
+            </a:pPr>
+            <a:r>
+              <a:rPr lang="en-US" dirty="0" err="1" smtClean="0">
+                <a:solidFill>
+                  <a:srgbClr val="FF0000"/>
+                </a:solidFill>
+              </a:rPr>
+              <a:t>Ikbe</a:t>
+            </a:r>
+            <a:r>
+              <a:rPr lang="en-US" dirty="0" smtClean="0">
+                <a:solidFill>
+                  <a:srgbClr val="FF0000"/>
+                </a:solidFill>
+              </a:rPr>
+              <a:t>: </a:t>
+            </a:r>
+            <a:r>
+              <a:rPr lang="en-US" dirty="0" smtClean="0"/>
+              <a:t>not sure, </a:t>
+            </a:r>
+            <a:r>
+              <a:rPr lang="en-US" dirty="0" err="1" smtClean="0"/>
+              <a:t>untouch</a:t>
+            </a:r>
+            <a:endParaRPr lang="en-US" baseline="0" dirty="0" smtClean="0"/>
+          </a:p>
+          <a:p>
+            <a:pPr marL="228600" indent="-228600">
+              <a:buAutoNum type="arabicPeriod"/>
+            </a:pPr>
+            <a:endParaRPr lang="en-US" dirty="0"/>
+          </a:p>
+        </p:txBody>
+      </p:sp>
+      <p:pic>
+        <p:nvPicPr>
+          <p:cNvPr id="3" name="Picture 2"/>
+          <p:cNvPicPr>
+            <a:picLocks noChangeAspect="1"/>
+          </p:cNvPicPr>
+          <p:nvPr/>
+        </p:nvPicPr>
+        <p:blipFill>
+          <a:blip r:embed="rId2">
+            <a:extLst>
+              <a:ext uri="{28A0092B-C50C-407E-A947-70E740481C1C}">
+                <a14:useLocalDpi xmlns:a14="http://schemas.microsoft.com/office/drawing/2010/main" val="0"/>
+              </a:ext>
+            </a:extLst>
+          </a:blip>
+          <a:stretch>
+            <a:fillRect/>
+          </a:stretch>
+        </p:blipFill>
+        <p:spPr>
+          <a:xfrm>
+            <a:off x="396461" y="820410"/>
+            <a:ext cx="7315200" cy="5486400"/>
+          </a:xfrm>
+          <a:prstGeom prst="rect">
+            <a:avLst/>
+          </a:prstGeom>
+        </p:spPr>
+      </p:pic>
+    </p:spTree>
+    <p:extLst>
+      <p:ext uri="{BB962C8B-B14F-4D97-AF65-F5344CB8AC3E}">
+        <p14:creationId xmlns:p14="http://schemas.microsoft.com/office/powerpoint/2010/main" val="2078107280"/>
+      </p:ext>
+    </p:extLst>
+  </p:cSld>
+  <p:clrMapOvr>
+    <a:masterClrMapping/>
+  </p:clrMapOvr>
+  <p:timing>
+    <p:tnLst>
+      <p:par>
+        <p:cTn id="1" dur="indefinite" restart="never" nodeType="tmRoot"/>
+      </p:par>
+    </p:tnLst>
+  </p:timing>
+</p:sld>
+</file>
+
+<file path=ppt/slides/slide7.xml><?xml version="1.0" encoding="utf-8"?>
+<p:sld xmlns:a="http://schemas.openxmlformats.org/drawingml/2006/main" xmlns:r="http://schemas.openxmlformats.org/officeDocument/2006/relationships" xmlns:p="http://schemas.openxmlformats.org/presentationml/2006/main">
+  <p:cSld>
+    <p:spTree>
+      <p:nvGrpSpPr>
+        <p:cNvPr id="1" name=""/>
+        <p:cNvGrpSpPr/>
+        <p:nvPr/>
+      </p:nvGrpSpPr>
+      <p:grpSpPr>
+        <a:xfrm>
+          <a:off x="0" y="0"/>
+          <a:ext cx="0" cy="0"/>
+          <a:chOff x="0" y="0"/>
+          <a:chExt cx="0" cy="0"/>
+        </a:xfrm>
+      </p:grpSpPr>
+      <p:sp>
+        <p:nvSpPr>
+          <p:cNvPr id="2" name="Rectangle 1"/>
+          <p:cNvSpPr/>
+          <p:nvPr/>
+        </p:nvSpPr>
+        <p:spPr>
+          <a:xfrm>
+            <a:off x="1549400" y="235635"/>
+            <a:ext cx="9956800" cy="584775"/>
+          </a:xfrm>
+          <a:prstGeom prst="rect">
+            <a:avLst/>
+          </a:prstGeom>
+        </p:spPr>
+        <p:txBody>
+          <a:bodyPr wrap="square">
+            <a:spAutoFit/>
+          </a:bodyPr>
+          <a:lstStyle/>
+          <a:p>
+            <a:r>
+              <a:rPr lang="en-US" sz="3200" dirty="0" smtClean="0"/>
+              <a:t>Accounting cell type differences – Simulation results</a:t>
+            </a:r>
+            <a:endParaRPr lang="en-US" sz="3200" dirty="0"/>
+          </a:p>
+        </p:txBody>
+      </p:sp>
+      <p:sp>
+        <p:nvSpPr>
+          <p:cNvPr id="4" name="Rectangle 3"/>
+          <p:cNvSpPr/>
+          <p:nvPr/>
+        </p:nvSpPr>
+        <p:spPr>
+          <a:xfrm>
+            <a:off x="7711661" y="2409448"/>
+            <a:ext cx="4267200" cy="2585323"/>
+          </a:xfrm>
+          <a:prstGeom prst="rect">
+            <a:avLst/>
+          </a:prstGeom>
+        </p:spPr>
+        <p:txBody>
+          <a:bodyPr wrap="square">
+            <a:spAutoFit/>
+          </a:bodyPr>
+          <a:lstStyle/>
+          <a:p>
+            <a:pPr marL="228600" indent="-228600">
+              <a:buFontTx/>
+              <a:buAutoNum type="arabicPeriod"/>
+            </a:pPr>
+            <a:r>
+              <a:rPr lang="en-US" dirty="0">
+                <a:solidFill>
+                  <a:srgbClr val="FF0000"/>
+                </a:solidFill>
+              </a:rPr>
+              <a:t>Basal </a:t>
+            </a:r>
+            <a:r>
+              <a:rPr lang="en-US" dirty="0"/>
+              <a:t>transcription rate constant: </a:t>
+            </a:r>
+            <a:r>
+              <a:rPr lang="en-US" dirty="0" err="1">
+                <a:solidFill>
+                  <a:srgbClr val="FF0000"/>
+                </a:solidFill>
+              </a:rPr>
+              <a:t>IkBb</a:t>
+            </a:r>
+            <a:r>
+              <a:rPr lang="en-US" dirty="0">
+                <a:solidFill>
+                  <a:srgbClr val="FF0000"/>
+                </a:solidFill>
+              </a:rPr>
+              <a:t> increase</a:t>
+            </a:r>
+            <a:r>
+              <a:rPr lang="en-US" dirty="0"/>
+              <a:t> </a:t>
+            </a:r>
+            <a:r>
+              <a:rPr lang="en-US" dirty="0">
+                <a:solidFill>
+                  <a:srgbClr val="FF0000"/>
+                </a:solidFill>
+              </a:rPr>
+              <a:t>3 </a:t>
+            </a:r>
+            <a:r>
+              <a:rPr lang="en-US" dirty="0" smtClean="0">
+                <a:solidFill>
+                  <a:srgbClr val="FF0000"/>
+                </a:solidFill>
+              </a:rPr>
+              <a:t>fold</a:t>
+            </a:r>
+            <a:endParaRPr lang="en-US" dirty="0" smtClean="0">
+              <a:solidFill>
+                <a:srgbClr val="FF0000"/>
+              </a:solidFill>
+            </a:endParaRPr>
+          </a:p>
+          <a:p>
+            <a:pPr marL="228600" indent="-228600">
+              <a:buFontTx/>
+              <a:buAutoNum type="arabicPeriod"/>
+            </a:pPr>
+            <a:r>
+              <a:rPr lang="en-US" dirty="0" smtClean="0">
+                <a:solidFill>
+                  <a:srgbClr val="FF0000"/>
+                </a:solidFill>
+              </a:rPr>
+              <a:t>Basal </a:t>
+            </a:r>
+            <a:r>
+              <a:rPr lang="en-US" baseline="0" dirty="0" smtClean="0"/>
+              <a:t>transcription rate constant: </a:t>
+            </a:r>
+            <a:r>
+              <a:rPr lang="en-US" baseline="0" dirty="0" err="1" smtClean="0">
+                <a:solidFill>
+                  <a:srgbClr val="FF0000"/>
+                </a:solidFill>
+              </a:rPr>
+              <a:t>IkBd</a:t>
+            </a:r>
+            <a:r>
+              <a:rPr lang="en-US" baseline="0" dirty="0" smtClean="0">
+                <a:solidFill>
+                  <a:srgbClr val="FF0000"/>
+                </a:solidFill>
+              </a:rPr>
+              <a:t> </a:t>
+            </a:r>
+            <a:r>
+              <a:rPr lang="en-US" baseline="0" dirty="0" smtClean="0">
+                <a:solidFill>
+                  <a:srgbClr val="FF0000"/>
+                </a:solidFill>
+              </a:rPr>
+              <a:t>decrease</a:t>
+            </a:r>
+            <a:r>
+              <a:rPr lang="en-US" baseline="0" dirty="0" smtClean="0"/>
+              <a:t> </a:t>
+            </a:r>
+            <a:r>
+              <a:rPr lang="en-US" dirty="0">
+                <a:solidFill>
+                  <a:srgbClr val="FF0000"/>
+                </a:solidFill>
+              </a:rPr>
+              <a:t>5 </a:t>
+            </a:r>
+            <a:r>
+              <a:rPr lang="en-US" dirty="0" smtClean="0">
+                <a:solidFill>
+                  <a:srgbClr val="FF0000"/>
+                </a:solidFill>
+              </a:rPr>
+              <a:t>fold</a:t>
+            </a:r>
+            <a:r>
+              <a:rPr lang="en-US" baseline="0" dirty="0" smtClean="0"/>
+              <a:t> </a:t>
+            </a:r>
+            <a:endParaRPr lang="en-US" baseline="0" dirty="0" smtClean="0"/>
+          </a:p>
+          <a:p>
+            <a:pPr marL="228600" indent="-228600">
+              <a:buFontTx/>
+              <a:buAutoNum type="arabicPeriod"/>
+              <a:defRPr/>
+            </a:pPr>
+            <a:r>
+              <a:rPr lang="en-US" dirty="0" err="1" smtClean="0">
+                <a:solidFill>
+                  <a:srgbClr val="FF0000"/>
+                </a:solidFill>
+              </a:rPr>
+              <a:t>Ikbe</a:t>
+            </a:r>
+            <a:r>
+              <a:rPr lang="en-US" dirty="0" smtClean="0">
+                <a:solidFill>
+                  <a:srgbClr val="FF0000"/>
+                </a:solidFill>
+              </a:rPr>
+              <a:t>: </a:t>
+            </a:r>
+            <a:r>
+              <a:rPr lang="en-US" dirty="0" smtClean="0"/>
+              <a:t>not sure, </a:t>
+            </a:r>
+            <a:r>
+              <a:rPr lang="en-US" dirty="0" err="1" smtClean="0"/>
+              <a:t>untouch</a:t>
+            </a:r>
+            <a:endParaRPr lang="en-US" dirty="0" smtClean="0"/>
+          </a:p>
+          <a:p>
+            <a:pPr marL="228600" indent="-228600">
+              <a:buFontTx/>
+              <a:buAutoNum type="arabicPeriod"/>
+              <a:defRPr/>
+            </a:pPr>
+            <a:r>
+              <a:rPr lang="en-US" dirty="0" smtClean="0">
+                <a:solidFill>
+                  <a:srgbClr val="FF0000"/>
+                </a:solidFill>
+              </a:rPr>
+              <a:t>Induced </a:t>
+            </a:r>
+            <a:r>
+              <a:rPr lang="en-US" dirty="0" smtClean="0"/>
+              <a:t>transcription </a:t>
+            </a:r>
+            <a:r>
+              <a:rPr lang="en-US" dirty="0"/>
+              <a:t>rate constant: </a:t>
+            </a:r>
+            <a:r>
+              <a:rPr lang="en-US" dirty="0" err="1" smtClean="0">
+                <a:solidFill>
+                  <a:srgbClr val="FF0000"/>
+                </a:solidFill>
+              </a:rPr>
+              <a:t>IkBb</a:t>
+            </a:r>
+            <a:r>
+              <a:rPr lang="en-US" dirty="0" smtClean="0">
+                <a:solidFill>
+                  <a:srgbClr val="FF0000"/>
+                </a:solidFill>
+              </a:rPr>
+              <a:t> </a:t>
+            </a:r>
+            <a:r>
+              <a:rPr lang="en-US" dirty="0">
+                <a:solidFill>
+                  <a:srgbClr val="FF0000"/>
+                </a:solidFill>
+              </a:rPr>
+              <a:t>decrease</a:t>
+            </a:r>
+            <a:r>
+              <a:rPr lang="en-US" dirty="0"/>
+              <a:t> </a:t>
+            </a:r>
+            <a:r>
+              <a:rPr lang="en-US" dirty="0" smtClean="0">
+                <a:solidFill>
+                  <a:srgbClr val="FF0000"/>
+                </a:solidFill>
+              </a:rPr>
+              <a:t>from 0.025 to 0.6</a:t>
+            </a:r>
+            <a:endParaRPr lang="en-US" dirty="0"/>
+          </a:p>
+          <a:p>
+            <a:pPr marL="228600" indent="-228600">
+              <a:buFontTx/>
+              <a:buAutoNum type="arabicPeriod"/>
+              <a:defRPr/>
+            </a:pPr>
+            <a:endParaRPr lang="en-US" baseline="0" dirty="0" smtClean="0"/>
+          </a:p>
+          <a:p>
+            <a:pPr marL="228600" indent="-228600">
+              <a:buAutoNum type="arabicPeriod"/>
+            </a:pPr>
+            <a:endParaRPr lang="en-US" dirty="0"/>
+          </a:p>
+        </p:txBody>
+      </p:sp>
+      <p:pic>
+        <p:nvPicPr>
+          <p:cNvPr id="5" name="Picture 4"/>
+          <p:cNvPicPr>
+            <a:picLocks noChangeAspect="1"/>
+          </p:cNvPicPr>
+          <p:nvPr/>
+        </p:nvPicPr>
+        <p:blipFill>
+          <a:blip r:embed="rId3">
+            <a:extLst>
+              <a:ext uri="{28A0092B-C50C-407E-A947-70E740481C1C}">
+                <a14:useLocalDpi xmlns:a14="http://schemas.microsoft.com/office/drawing/2010/main" val="0"/>
+              </a:ext>
+            </a:extLst>
+          </a:blip>
+          <a:stretch>
+            <a:fillRect/>
+          </a:stretch>
+        </p:blipFill>
+        <p:spPr>
+          <a:xfrm>
+            <a:off x="396461" y="820410"/>
+            <a:ext cx="7315200" cy="5486400"/>
+          </a:xfrm>
+          <a:prstGeom prst="rect">
+            <a:avLst/>
+          </a:prstGeom>
+        </p:spPr>
+      </p:pic>
+    </p:spTree>
+    <p:extLst>
+      <p:ext uri="{BB962C8B-B14F-4D97-AF65-F5344CB8AC3E}">
+        <p14:creationId xmlns:p14="http://schemas.microsoft.com/office/powerpoint/2010/main" val="1998994314"/>
+      </p:ext>
+    </p:extLst>
+  </p:cSld>
+  <p:clrMapOvr>
+    <a:masterClrMapping/>
+  </p:clrMapOvr>
+  <p:timing>
+    <p:tnLst>
+      <p:par>
+        <p:cTn id="1" dur="indefinite" restart="never" nodeType="tmRoot"/>
+      </p:par>
+    </p:tnLst>
+  </p:timing>
 </p:sld>
 </file>
 

</xml_diff>